<commit_message>
Grafiken als svg in PPP
</commit_message>
<xml_diff>
--- a/Vorträge/VortragFlorianSchierzBloomfilter.pptx
+++ b/Vorträge/VortragFlorianSchierzBloomfilter.pptx
@@ -294,7 +294,7 @@
           <a:p>
             <a:fld id="{6DB929B3-EDC4-4292-BA5A-2119A16C91BC}" type="datetimeFigureOut">
               <a:rPr lang="de-DE" smtClean="0"/>
-              <a:t>12.05.2022</a:t>
+              <a:t>15.05.2022</a:t>
             </a:fld>
             <a:endParaRPr lang="de-DE"/>
           </a:p>
@@ -5144,8 +5144,8 @@
           </a:p>
         </p:txBody>
       </p:sp>
-      <mc:AlternateContent xmlns:mc="http://schemas.openxmlformats.org/markup-compatibility/2006">
-        <mc:Choice xmlns:a14="http://schemas.microsoft.com/office/drawing/2010/main" Requires="a14">
+      <mc:AlternateContent xmlns:mc="http://schemas.openxmlformats.org/markup-compatibility/2006" xmlns:a14="http://schemas.microsoft.com/office/drawing/2010/main">
+        <mc:Choice Requires="a14">
           <p:sp>
             <p:nvSpPr>
               <p:cNvPr id="11" name="Textfeld 10">
@@ -5184,6 +5184,7 @@
                 </a:r>
               </a:p>
               <a:p>
+                <a:pPr/>
                 <a14:m>
                   <m:oMathPara xmlns:m="http://schemas.openxmlformats.org/officeDocument/2006/math">
                     <m:oMathParaPr>
@@ -5292,6 +5293,7 @@
                 </a:r>
               </a:p>
               <a:p>
+                <a:pPr/>
                 <a14:m>
                   <m:oMathPara xmlns:m="http://schemas.openxmlformats.org/officeDocument/2006/math">
                     <m:oMathParaPr>
@@ -5608,7 +5610,7 @@
             </p:txBody>
           </p:sp>
         </mc:Choice>
-        <mc:Fallback>
+        <mc:Fallback xmlns="">
           <p:sp>
             <p:nvSpPr>
               <p:cNvPr id="11" name="Textfeld 10">
@@ -5947,8 +5949,8 @@
           </a:p>
         </p:txBody>
       </p:sp>
-      <mc:AlternateContent xmlns:mc="http://schemas.openxmlformats.org/markup-compatibility/2006">
-        <mc:Choice xmlns:a14="http://schemas.microsoft.com/office/drawing/2010/main" Requires="a14">
+      <mc:AlternateContent xmlns:mc="http://schemas.openxmlformats.org/markup-compatibility/2006" xmlns:a14="http://schemas.microsoft.com/office/drawing/2010/main">
+        <mc:Choice Requires="a14">
           <p:sp>
             <p:nvSpPr>
               <p:cNvPr id="11" name="Textfeld 10">
@@ -6303,7 +6305,7 @@
             </p:txBody>
           </p:sp>
         </mc:Choice>
-        <mc:Fallback>
+        <mc:Fallback xmlns="">
           <p:sp>
             <p:nvSpPr>
               <p:cNvPr id="11" name="Textfeld 10">
@@ -6725,10 +6727,10 @@
       </p:sp>
       <p:pic>
         <p:nvPicPr>
-          <p:cNvPr id="5" name="Grafik 4">
+          <p:cNvPr id="9" name="Grafik 8">
             <a:extLst>
               <a:ext uri="{FF2B5EF4-FFF2-40B4-BE49-F238E27FC236}">
-                <a16:creationId xmlns:a16="http://schemas.microsoft.com/office/drawing/2014/main" id="{F4226E50-74EA-AB84-262E-28462E65E15B}"/>
+                <a16:creationId xmlns:a16="http://schemas.microsoft.com/office/drawing/2014/main" id="{CDFCF468-864E-36CC-5BE5-7B698465124E}"/>
               </a:ext>
             </a:extLst>
           </p:cNvPr>
@@ -6737,22 +6739,24 @@
           </p:cNvPicPr>
           <p:nvPr/>
         </p:nvPicPr>
-        <p:blipFill>
+        <p:blipFill rotWithShape="1">
           <a:blip r:embed="rId2">
             <a:extLst>
               <a:ext uri="{28A0092B-C50C-407E-A947-70E740481C1C}">
                 <a14:useLocalDpi xmlns:a14="http://schemas.microsoft.com/office/drawing/2010/main" val="0"/>
               </a:ext>
+              <a:ext uri="{96DAC541-7B7A-43D3-8B79-37D633B846F1}">
+                <asvg:svgBlip xmlns:asvg="http://schemas.microsoft.com/office/drawing/2016/SVG/main" r:embed="rId3"/>
+              </a:ext>
             </a:extLst>
           </a:blip>
-          <a:stretch>
-            <a:fillRect/>
-          </a:stretch>
+          <a:srcRect r="48020" b="68200"/>
+          <a:stretch/>
         </p:blipFill>
         <p:spPr>
           <a:xfrm>
-            <a:off x="4861156" y="676010"/>
-            <a:ext cx="3448531" cy="3791479"/>
+            <a:off x="4572000" y="629460"/>
+            <a:ext cx="4824536" cy="4174538"/>
           </a:xfrm>
           <a:prstGeom prst="rect">
             <a:avLst/>
@@ -7075,10 +7079,10 @@
       </p:sp>
       <p:pic>
         <p:nvPicPr>
-          <p:cNvPr id="9" name="Grafik 8">
+          <p:cNvPr id="5" name="Grafik 4">
             <a:extLst>
               <a:ext uri="{FF2B5EF4-FFF2-40B4-BE49-F238E27FC236}">
-                <a16:creationId xmlns:a16="http://schemas.microsoft.com/office/drawing/2014/main" id="{A19A5CE9-8EC0-9C15-5A01-3850E174275C}"/>
+                <a16:creationId xmlns:a16="http://schemas.microsoft.com/office/drawing/2014/main" id="{A3C3CBBE-E493-5801-EDE4-58B188005AEF}"/>
               </a:ext>
             </a:extLst>
           </p:cNvPr>
@@ -7087,22 +7091,24 @@
           </p:cNvPicPr>
           <p:nvPr/>
         </p:nvPicPr>
-        <p:blipFill>
+        <p:blipFill rotWithShape="1">
           <a:blip r:embed="rId2">
             <a:extLst>
               <a:ext uri="{28A0092B-C50C-407E-A947-70E740481C1C}">
                 <a14:useLocalDpi xmlns:a14="http://schemas.microsoft.com/office/drawing/2010/main" val="0"/>
               </a:ext>
+              <a:ext uri="{96DAC541-7B7A-43D3-8B79-37D633B846F1}">
+                <asvg:svgBlip xmlns:asvg="http://schemas.microsoft.com/office/drawing/2016/SVG/main" r:embed="rId3"/>
+              </a:ext>
             </a:extLst>
           </a:blip>
-          <a:stretch>
-            <a:fillRect/>
-          </a:stretch>
+          <a:srcRect b="66800"/>
+          <a:stretch/>
         </p:blipFill>
         <p:spPr>
           <a:xfrm>
-            <a:off x="5004048" y="495000"/>
-            <a:ext cx="3448531" cy="3791479"/>
+            <a:off x="2627784" y="458579"/>
+            <a:ext cx="8089021" cy="3798362"/>
           </a:xfrm>
           <a:prstGeom prst="rect">
             <a:avLst/>
@@ -7237,8 +7243,8 @@
           </a:p>
         </p:txBody>
       </p:sp>
-      <mc:AlternateContent xmlns:mc="http://schemas.openxmlformats.org/markup-compatibility/2006">
-        <mc:Choice xmlns:a14="http://schemas.microsoft.com/office/drawing/2010/main" Requires="a14">
+      <mc:AlternateContent xmlns:mc="http://schemas.openxmlformats.org/markup-compatibility/2006" xmlns:a14="http://schemas.microsoft.com/office/drawing/2010/main">
+        <mc:Choice Requires="a14">
           <p:sp>
             <p:nvSpPr>
               <p:cNvPr id="8" name="Textfeld 7">
@@ -7468,7 +7474,7 @@
             </p:txBody>
           </p:sp>
         </mc:Choice>
-        <mc:Fallback>
+        <mc:Fallback xmlns="">
           <p:sp>
             <p:nvSpPr>
               <p:cNvPr id="8" name="Textfeld 7">
@@ -7515,10 +7521,10 @@
       </mc:AlternateContent>
       <p:pic>
         <p:nvPicPr>
-          <p:cNvPr id="5" name="Grafik 4">
+          <p:cNvPr id="9" name="Grafik 8">
             <a:extLst>
               <a:ext uri="{FF2B5EF4-FFF2-40B4-BE49-F238E27FC236}">
-                <a16:creationId xmlns:a16="http://schemas.microsoft.com/office/drawing/2014/main" id="{0EAEE904-19DF-3D77-0349-D7082D7CCBAF}"/>
+                <a16:creationId xmlns:a16="http://schemas.microsoft.com/office/drawing/2014/main" id="{045DDFF4-437E-05A0-0DEB-64A455B72FC6}"/>
               </a:ext>
             </a:extLst>
           </p:cNvPr>
@@ -7527,22 +7533,24 @@
           </p:cNvPicPr>
           <p:nvPr/>
         </p:nvPicPr>
-        <p:blipFill>
+        <p:blipFill rotWithShape="1">
           <a:blip r:embed="rId3">
             <a:extLst>
               <a:ext uri="{28A0092B-C50C-407E-A947-70E740481C1C}">
                 <a14:useLocalDpi xmlns:a14="http://schemas.microsoft.com/office/drawing/2010/main" val="0"/>
               </a:ext>
+              <a:ext uri="{96DAC541-7B7A-43D3-8B79-37D633B846F1}">
+                <asvg:svgBlip xmlns:asvg="http://schemas.microsoft.com/office/drawing/2016/SVG/main" r:embed="rId4"/>
+              </a:ext>
             </a:extLst>
           </a:blip>
-          <a:stretch>
-            <a:fillRect/>
-          </a:stretch>
+          <a:srcRect l="18319" r="16338" b="66800"/>
+          <a:stretch/>
         </p:blipFill>
         <p:spPr>
           <a:xfrm>
-            <a:off x="5083909" y="549339"/>
-            <a:ext cx="3448531" cy="3791479"/>
+            <a:off x="3851920" y="511938"/>
+            <a:ext cx="5471552" cy="3932020"/>
           </a:xfrm>
           <a:prstGeom prst="rect">
             <a:avLst/>
@@ -7894,10 +7902,10 @@
       </p:sp>
       <p:pic>
         <p:nvPicPr>
-          <p:cNvPr id="9" name="Grafik 8">
+          <p:cNvPr id="5" name="Grafik 4">
             <a:extLst>
               <a:ext uri="{FF2B5EF4-FFF2-40B4-BE49-F238E27FC236}">
-                <a16:creationId xmlns:a16="http://schemas.microsoft.com/office/drawing/2014/main" id="{3596AB70-1E72-078E-F9A8-D5480715607A}"/>
+                <a16:creationId xmlns:a16="http://schemas.microsoft.com/office/drawing/2014/main" id="{1537EFDE-8C63-B2C2-1F5B-084C2E2E46E2}"/>
               </a:ext>
             </a:extLst>
           </p:cNvPr>
@@ -7906,22 +7914,24 @@
           </p:cNvPicPr>
           <p:nvPr/>
         </p:nvPicPr>
-        <p:blipFill>
+        <p:blipFill rotWithShape="1">
           <a:blip r:embed="rId2">
             <a:extLst>
               <a:ext uri="{28A0092B-C50C-407E-A947-70E740481C1C}">
                 <a14:useLocalDpi xmlns:a14="http://schemas.microsoft.com/office/drawing/2010/main" val="0"/>
               </a:ext>
+              <a:ext uri="{96DAC541-7B7A-43D3-8B79-37D633B846F1}">
+                <asvg:svgBlip xmlns:asvg="http://schemas.microsoft.com/office/drawing/2016/SVG/main" r:embed="rId3"/>
+              </a:ext>
             </a:extLst>
           </a:blip>
-          <a:stretch>
-            <a:fillRect/>
-          </a:stretch>
+          <a:srcRect l="18319" r="16338" b="62600"/>
+          <a:stretch/>
         </p:blipFill>
         <p:spPr>
           <a:xfrm>
-            <a:off x="5160473" y="495000"/>
-            <a:ext cx="3448531" cy="3791479"/>
+            <a:off x="4355976" y="495000"/>
+            <a:ext cx="5165347" cy="4181549"/>
           </a:xfrm>
           <a:prstGeom prst="rect">
             <a:avLst/>
@@ -11893,10 +11903,10 @@
       </p:sp>
       <p:pic>
         <p:nvPicPr>
-          <p:cNvPr id="8" name="Grafik 7" descr="Ein Bild, das Text, Whiteboard enthält.&#10;&#10;Automatisch generierte Beschreibung">
+          <p:cNvPr id="5" name="Grafik 4">
             <a:extLst>
               <a:ext uri="{FF2B5EF4-FFF2-40B4-BE49-F238E27FC236}">
-                <a16:creationId xmlns:a16="http://schemas.microsoft.com/office/drawing/2014/main" id="{8970ACEA-BE02-7884-1AC7-A73E41B979AE}"/>
+                <a16:creationId xmlns:a16="http://schemas.microsoft.com/office/drawing/2014/main" id="{2163E097-26A2-EFD4-4F56-AD2EF0308101}"/>
               </a:ext>
             </a:extLst>
           </p:cNvPr>
@@ -11905,22 +11915,24 @@
           </p:cNvPicPr>
           <p:nvPr/>
         </p:nvPicPr>
-        <p:blipFill>
+        <p:blipFill rotWithShape="1">
           <a:blip r:embed="rId2">
             <a:extLst>
               <a:ext uri="{28A0092B-C50C-407E-A947-70E740481C1C}">
                 <a14:useLocalDpi xmlns:a14="http://schemas.microsoft.com/office/drawing/2010/main" val="0"/>
               </a:ext>
+              <a:ext uri="{96DAC541-7B7A-43D3-8B79-37D633B846F1}">
+                <asvg:svgBlip xmlns:asvg="http://schemas.microsoft.com/office/drawing/2016/SVG/main" r:embed="rId3"/>
+              </a:ext>
             </a:extLst>
           </a:blip>
-          <a:stretch>
-            <a:fillRect/>
-          </a:stretch>
+          <a:srcRect b="66800"/>
+          <a:stretch/>
         </p:blipFill>
         <p:spPr>
           <a:xfrm>
-            <a:off x="1475656" y="2755360"/>
-            <a:ext cx="5328592" cy="2064829"/>
+            <a:off x="2303748" y="2490838"/>
+            <a:ext cx="4608512" cy="2164019"/>
           </a:xfrm>
           <a:prstGeom prst="rect">
             <a:avLst/>
@@ -12235,10 +12247,10 @@
       </p:sp>
       <p:pic>
         <p:nvPicPr>
-          <p:cNvPr id="5" name="Grafik 4">
+          <p:cNvPr id="9" name="Grafik 8">
             <a:extLst>
               <a:ext uri="{FF2B5EF4-FFF2-40B4-BE49-F238E27FC236}">
-                <a16:creationId xmlns:a16="http://schemas.microsoft.com/office/drawing/2014/main" id="{38C9B57D-35E4-4281-C65D-7F681238E065}"/>
+                <a16:creationId xmlns:a16="http://schemas.microsoft.com/office/drawing/2014/main" id="{770E8199-D9EB-DDFE-B306-18878E8EC9A6}"/>
               </a:ext>
             </a:extLst>
           </p:cNvPr>
@@ -12247,22 +12259,24 @@
           </p:cNvPicPr>
           <p:nvPr/>
         </p:nvPicPr>
-        <p:blipFill>
+        <p:blipFill rotWithShape="1">
           <a:blip r:embed="rId2">
             <a:extLst>
               <a:ext uri="{28A0092B-C50C-407E-A947-70E740481C1C}">
                 <a14:useLocalDpi xmlns:a14="http://schemas.microsoft.com/office/drawing/2010/main" val="0"/>
               </a:ext>
+              <a:ext uri="{96DAC541-7B7A-43D3-8B79-37D633B846F1}">
+                <asvg:svgBlip xmlns:asvg="http://schemas.microsoft.com/office/drawing/2016/SVG/main" r:embed="rId3"/>
+              </a:ext>
             </a:extLst>
           </a:blip>
-          <a:stretch>
-            <a:fillRect/>
-          </a:stretch>
+          <a:srcRect l="6438" b="44350"/>
+          <a:stretch/>
         </p:blipFill>
         <p:spPr>
           <a:xfrm>
-            <a:off x="4860032" y="1909519"/>
-            <a:ext cx="3295552" cy="2519266"/>
+            <a:off x="4716015" y="1404062"/>
+            <a:ext cx="4051804" cy="3408551"/>
           </a:xfrm>
           <a:prstGeom prst="rect">
             <a:avLst/>
@@ -12495,42 +12509,6 @@
           </a:p>
         </p:txBody>
       </p:sp>
-      <p:pic>
-        <p:nvPicPr>
-          <p:cNvPr id="9" name="Grafik 8">
-            <a:extLst>
-              <a:ext uri="{FF2B5EF4-FFF2-40B4-BE49-F238E27FC236}">
-                <a16:creationId xmlns:a16="http://schemas.microsoft.com/office/drawing/2014/main" id="{1AFB56DE-1A7C-A99D-7640-42285F30420C}"/>
-              </a:ext>
-            </a:extLst>
-          </p:cNvPr>
-          <p:cNvPicPr>
-            <a:picLocks noChangeAspect="1"/>
-          </p:cNvPicPr>
-          <p:nvPr/>
-        </p:nvPicPr>
-        <p:blipFill>
-          <a:blip r:embed="rId2" cstate="print">
-            <a:extLst>
-              <a:ext uri="{28A0092B-C50C-407E-A947-70E740481C1C}">
-                <a14:useLocalDpi xmlns:a14="http://schemas.microsoft.com/office/drawing/2010/main" val="0"/>
-              </a:ext>
-            </a:extLst>
-          </a:blip>
-          <a:stretch>
-            <a:fillRect/>
-          </a:stretch>
-        </p:blipFill>
-        <p:spPr>
-          <a:xfrm>
-            <a:off x="467544" y="2571750"/>
-            <a:ext cx="4494693" cy="1741694"/>
-          </a:xfrm>
-          <a:prstGeom prst="rect">
-            <a:avLst/>
-          </a:prstGeom>
-        </p:spPr>
-      </p:pic>
       <p:sp>
         <p:nvSpPr>
           <p:cNvPr id="10" name="Textfeld 9">
@@ -12655,10 +12633,10 @@
       </p:sp>
       <p:pic>
         <p:nvPicPr>
-          <p:cNvPr id="12" name="Grafik 11">
+          <p:cNvPr id="5" name="Grafik 4">
             <a:extLst>
               <a:ext uri="{FF2B5EF4-FFF2-40B4-BE49-F238E27FC236}">
-                <a16:creationId xmlns:a16="http://schemas.microsoft.com/office/drawing/2014/main" id="{CFBA0D7A-630C-D58E-2DA8-D39C4C298BC9}"/>
+                <a16:creationId xmlns:a16="http://schemas.microsoft.com/office/drawing/2014/main" id="{35CEEA72-57FF-750D-A4BB-2818B2517313}"/>
               </a:ext>
             </a:extLst>
           </p:cNvPr>
@@ -12668,20 +12646,61 @@
           <p:nvPr/>
         </p:nvPicPr>
         <p:blipFill rotWithShape="1">
-          <a:blip r:embed="rId3">
+          <a:blip r:embed="rId2">
             <a:extLst>
               <a:ext uri="{28A0092B-C50C-407E-A947-70E740481C1C}">
                 <a14:useLocalDpi xmlns:a14="http://schemas.microsoft.com/office/drawing/2010/main" val="0"/>
               </a:ext>
+              <a:ext uri="{96DAC541-7B7A-43D3-8B79-37D633B846F1}">
+                <asvg:svgBlip xmlns:asvg="http://schemas.microsoft.com/office/drawing/2016/SVG/main" r:embed="rId3"/>
+              </a:ext>
             </a:extLst>
           </a:blip>
-          <a:srcRect r="46850"/>
+          <a:srcRect b="73800"/>
           <a:stretch/>
         </p:blipFill>
         <p:spPr>
           <a:xfrm>
-            <a:off x="4932040" y="2355378"/>
-            <a:ext cx="2825084" cy="2059682"/>
+            <a:off x="267638" y="2489330"/>
+            <a:ext cx="4380926" cy="1623424"/>
+          </a:xfrm>
+          <a:prstGeom prst="rect">
+            <a:avLst/>
+          </a:prstGeom>
+        </p:spPr>
+      </p:pic>
+      <p:pic>
+        <p:nvPicPr>
+          <p:cNvPr id="13" name="Grafik 12">
+            <a:extLst>
+              <a:ext uri="{FF2B5EF4-FFF2-40B4-BE49-F238E27FC236}">
+                <a16:creationId xmlns:a16="http://schemas.microsoft.com/office/drawing/2014/main" id="{9349BD94-F644-5E57-63B7-E4A61990DF9B}"/>
+              </a:ext>
+            </a:extLst>
+          </p:cNvPr>
+          <p:cNvPicPr>
+            <a:picLocks noChangeAspect="1"/>
+          </p:cNvPicPr>
+          <p:nvPr/>
+        </p:nvPicPr>
+        <p:blipFill rotWithShape="1">
+          <a:blip r:embed="rId4">
+            <a:extLst>
+              <a:ext uri="{28A0092B-C50C-407E-A947-70E740481C1C}">
+                <a14:useLocalDpi xmlns:a14="http://schemas.microsoft.com/office/drawing/2010/main" val="0"/>
+              </a:ext>
+              <a:ext uri="{96DAC541-7B7A-43D3-8B79-37D633B846F1}">
+                <asvg:svgBlip xmlns:asvg="http://schemas.microsoft.com/office/drawing/2016/SVG/main" r:embed="rId5"/>
+              </a:ext>
+            </a:extLst>
+          </a:blip>
+          <a:srcRect b="62600"/>
+          <a:stretch/>
+        </p:blipFill>
+        <p:spPr>
+          <a:xfrm>
+            <a:off x="4403590" y="2393357"/>
+            <a:ext cx="4128850" cy="2184047"/>
           </a:xfrm>
           <a:prstGeom prst="rect">
             <a:avLst/>
@@ -12813,8 +12832,8 @@
           </a:p>
         </p:txBody>
       </p:sp>
-      <mc:AlternateContent xmlns:mc="http://schemas.openxmlformats.org/markup-compatibility/2006">
-        <mc:Choice xmlns:a14="http://schemas.microsoft.com/office/drawing/2010/main" Requires="a14">
+      <mc:AlternateContent xmlns:mc="http://schemas.openxmlformats.org/markup-compatibility/2006" xmlns:a14="http://schemas.microsoft.com/office/drawing/2010/main">
+        <mc:Choice Requires="a14">
           <p:sp>
             <p:nvSpPr>
               <p:cNvPr id="8" name="Textfeld 7">
@@ -13131,7 +13150,7 @@
             </p:txBody>
           </p:sp>
         </mc:Choice>
-        <mc:Fallback>
+        <mc:Fallback xmlns="">
           <p:sp>
             <p:nvSpPr>
               <p:cNvPr id="8" name="Textfeld 7">
@@ -13339,8 +13358,8 @@
           </a:p>
         </p:txBody>
       </p:sp>
-      <mc:AlternateContent xmlns:mc="http://schemas.openxmlformats.org/markup-compatibility/2006">
-        <mc:Choice xmlns:a14="http://schemas.microsoft.com/office/drawing/2010/main" Requires="a14">
+      <mc:AlternateContent xmlns:mc="http://schemas.openxmlformats.org/markup-compatibility/2006" xmlns:a14="http://schemas.microsoft.com/office/drawing/2010/main">
+        <mc:Choice Requires="a14">
           <p:sp>
             <p:nvSpPr>
               <p:cNvPr id="8" name="Textfeld 7">
@@ -13723,7 +13742,7 @@
             </p:txBody>
           </p:sp>
         </mc:Choice>
-        <mc:Fallback>
+        <mc:Fallback xmlns="">
           <p:sp>
             <p:nvSpPr>
               <p:cNvPr id="8" name="Textfeld 7">
@@ -14103,10 +14122,10 @@
       </p:sp>
       <p:pic>
         <p:nvPicPr>
-          <p:cNvPr id="10" name="Grafik 9">
+          <p:cNvPr id="5" name="Grafik 4">
             <a:extLst>
               <a:ext uri="{FF2B5EF4-FFF2-40B4-BE49-F238E27FC236}">
-                <a16:creationId xmlns:a16="http://schemas.microsoft.com/office/drawing/2014/main" id="{A6FACE89-2CD3-E7F6-DD43-D99F2DE7826A}"/>
+                <a16:creationId xmlns:a16="http://schemas.microsoft.com/office/drawing/2014/main" id="{5F5E1ED9-596F-4228-4B29-EC7B4B603A1B}"/>
               </a:ext>
             </a:extLst>
           </p:cNvPr>
@@ -14115,22 +14134,24 @@
           </p:cNvPicPr>
           <p:nvPr/>
         </p:nvPicPr>
-        <p:blipFill>
+        <p:blipFill rotWithShape="1">
           <a:blip r:embed="rId2">
             <a:extLst>
               <a:ext uri="{28A0092B-C50C-407E-A947-70E740481C1C}">
                 <a14:useLocalDpi xmlns:a14="http://schemas.microsoft.com/office/drawing/2010/main" val="0"/>
               </a:ext>
+              <a:ext uri="{96DAC541-7B7A-43D3-8B79-37D633B846F1}">
+                <asvg:svgBlip xmlns:asvg="http://schemas.microsoft.com/office/drawing/2016/SVG/main" r:embed="rId3"/>
+              </a:ext>
             </a:extLst>
           </a:blip>
-          <a:stretch>
-            <a:fillRect/>
-          </a:stretch>
+          <a:srcRect b="65400"/>
+          <a:stretch/>
         </p:blipFill>
         <p:spPr>
           <a:xfrm>
-            <a:off x="2123728" y="2213288"/>
-            <a:ext cx="6048672" cy="2343861"/>
+            <a:off x="1979712" y="2028532"/>
+            <a:ext cx="5544616" cy="2713373"/>
           </a:xfrm>
           <a:prstGeom prst="rect">
             <a:avLst/>

</xml_diff>